<commit_message>
replaced Presentation.pptx added some text and renaming Text Update file - Members Self Introduction
</commit_message>
<xml_diff>
--- a/Snake/Presentation.pptx
+++ b/Snake/Presentation.pptx
@@ -5,12 +5,13 @@
     <p:sldMasterId id="2147483648" r:id="rId1"/>
   </p:sldMasterIdLst>
   <p:notesMasterIdLst>
-    <p:notesMasterId r:id="rId5"/>
+    <p:notesMasterId r:id="rId6"/>
   </p:notesMasterIdLst>
   <p:sldIdLst>
-    <p:sldId id="260" r:id="rId2"/>
-    <p:sldId id="258" r:id="rId3"/>
-    <p:sldId id="257" r:id="rId4"/>
+    <p:sldId id="263" r:id="rId2"/>
+    <p:sldId id="260" r:id="rId3"/>
+    <p:sldId id="258" r:id="rId4"/>
+    <p:sldId id="257" r:id="rId5"/>
   </p:sldIdLst>
   <p:sldSz cx="9144000" cy="6858000" type="screen4x3"/>
   <p:notesSz cx="6858000" cy="9144000"/>
@@ -194,7 +195,6 @@
           <a:p>
             <a:fld id="{E22D25E4-38FB-48EB-9EC9-C6BBB762FAE2}" type="datetimeFigureOut">
               <a:rPr lang="bg-BG" smtClean="0"/>
-              <a:pPr/>
               <a:t>4.2.2015 г.</a:t>
             </a:fld>
             <a:endParaRPr lang="bg-BG"/>
@@ -354,7 +354,6 @@
           <a:p>
             <a:fld id="{489ACD23-9BD1-47D9-99AB-ECE17E0F5AF4}" type="slidenum">
               <a:rPr lang="bg-BG" smtClean="0"/>
-              <a:pPr/>
               <a:t>‹#›</a:t>
             </a:fld>
             <a:endParaRPr lang="bg-BG"/>
@@ -364,7 +363,7 @@
     </p:spTree>
     <p:extLst>
       <p:ext uri="{BB962C8B-B14F-4D97-AF65-F5344CB8AC3E}">
-        <p14:creationId xmlns="" xmlns:p14="http://schemas.microsoft.com/office/powerpoint/2010/main" val="1318601056"/>
+        <p14:creationId xmlns:p14="http://schemas.microsoft.com/office/powerpoint/2010/main" val="1318601056"/>
       </p:ext>
     </p:extLst>
   </p:cSld>
@@ -645,7 +644,6 @@
           <a:p>
             <a:fld id="{938F5CC5-E555-483F-A65E-16E573A50D64}" type="datetimeFigureOut">
               <a:rPr lang="bg-BG" smtClean="0"/>
-              <a:pPr/>
               <a:t>4.2.2015 г.</a:t>
             </a:fld>
             <a:endParaRPr lang="bg-BG"/>
@@ -688,7 +686,6 @@
           <a:p>
             <a:fld id="{58EF0536-55BB-4CAC-9AFA-DB428CE3602B}" type="slidenum">
               <a:rPr lang="bg-BG" smtClean="0"/>
-              <a:pPr/>
               <a:t>‹#›</a:t>
             </a:fld>
             <a:endParaRPr lang="bg-BG"/>
@@ -698,7 +695,7 @@
     </p:spTree>
     <p:extLst>
       <p:ext uri="{BB962C8B-B14F-4D97-AF65-F5344CB8AC3E}">
-        <p14:creationId xmlns="" xmlns:p14="http://schemas.microsoft.com/office/powerpoint/2010/main" val="597675508"/>
+        <p14:creationId xmlns:p14="http://schemas.microsoft.com/office/powerpoint/2010/main" val="597675508"/>
       </p:ext>
     </p:extLst>
   </p:cSld>
@@ -817,7 +814,6 @@
           <a:p>
             <a:fld id="{938F5CC5-E555-483F-A65E-16E573A50D64}" type="datetimeFigureOut">
               <a:rPr lang="bg-BG" smtClean="0"/>
-              <a:pPr/>
               <a:t>4.2.2015 г.</a:t>
             </a:fld>
             <a:endParaRPr lang="bg-BG"/>
@@ -860,7 +856,6 @@
           <a:p>
             <a:fld id="{58EF0536-55BB-4CAC-9AFA-DB428CE3602B}" type="slidenum">
               <a:rPr lang="bg-BG" smtClean="0"/>
-              <a:pPr/>
               <a:t>‹#›</a:t>
             </a:fld>
             <a:endParaRPr lang="bg-BG"/>
@@ -870,7 +865,7 @@
     </p:spTree>
     <p:extLst>
       <p:ext uri="{BB962C8B-B14F-4D97-AF65-F5344CB8AC3E}">
-        <p14:creationId xmlns="" xmlns:p14="http://schemas.microsoft.com/office/powerpoint/2010/main" val="1070200884"/>
+        <p14:creationId xmlns:p14="http://schemas.microsoft.com/office/powerpoint/2010/main" val="1070200884"/>
       </p:ext>
     </p:extLst>
   </p:cSld>
@@ -999,7 +994,6 @@
           <a:p>
             <a:fld id="{938F5CC5-E555-483F-A65E-16E573A50D64}" type="datetimeFigureOut">
               <a:rPr lang="bg-BG" smtClean="0"/>
-              <a:pPr/>
               <a:t>4.2.2015 г.</a:t>
             </a:fld>
             <a:endParaRPr lang="bg-BG"/>
@@ -1042,7 +1036,6 @@
           <a:p>
             <a:fld id="{58EF0536-55BB-4CAC-9AFA-DB428CE3602B}" type="slidenum">
               <a:rPr lang="bg-BG" smtClean="0"/>
-              <a:pPr/>
               <a:t>‹#›</a:t>
             </a:fld>
             <a:endParaRPr lang="bg-BG"/>
@@ -1052,7 +1045,7 @@
     </p:spTree>
     <p:extLst>
       <p:ext uri="{BB962C8B-B14F-4D97-AF65-F5344CB8AC3E}">
-        <p14:creationId xmlns="" xmlns:p14="http://schemas.microsoft.com/office/powerpoint/2010/main" val="3281884605"/>
+        <p14:creationId xmlns:p14="http://schemas.microsoft.com/office/powerpoint/2010/main" val="3281884605"/>
       </p:ext>
     </p:extLst>
   </p:cSld>
@@ -1171,7 +1164,6 @@
           <a:p>
             <a:fld id="{938F5CC5-E555-483F-A65E-16E573A50D64}" type="datetimeFigureOut">
               <a:rPr lang="bg-BG" smtClean="0"/>
-              <a:pPr/>
               <a:t>4.2.2015 г.</a:t>
             </a:fld>
             <a:endParaRPr lang="bg-BG"/>
@@ -1214,7 +1206,6 @@
           <a:p>
             <a:fld id="{58EF0536-55BB-4CAC-9AFA-DB428CE3602B}" type="slidenum">
               <a:rPr lang="bg-BG" smtClean="0"/>
-              <a:pPr/>
               <a:t>‹#›</a:t>
             </a:fld>
             <a:endParaRPr lang="bg-BG"/>
@@ -1224,7 +1215,7 @@
     </p:spTree>
     <p:extLst>
       <p:ext uri="{BB962C8B-B14F-4D97-AF65-F5344CB8AC3E}">
-        <p14:creationId xmlns="" xmlns:p14="http://schemas.microsoft.com/office/powerpoint/2010/main" val="556571612"/>
+        <p14:creationId xmlns:p14="http://schemas.microsoft.com/office/powerpoint/2010/main" val="556571612"/>
       </p:ext>
     </p:extLst>
   </p:cSld>
@@ -1419,7 +1410,6 @@
           <a:p>
             <a:fld id="{938F5CC5-E555-483F-A65E-16E573A50D64}" type="datetimeFigureOut">
               <a:rPr lang="bg-BG" smtClean="0"/>
-              <a:pPr/>
               <a:t>4.2.2015 г.</a:t>
             </a:fld>
             <a:endParaRPr lang="bg-BG"/>
@@ -1462,7 +1452,6 @@
           <a:p>
             <a:fld id="{58EF0536-55BB-4CAC-9AFA-DB428CE3602B}" type="slidenum">
               <a:rPr lang="bg-BG" smtClean="0"/>
-              <a:pPr/>
               <a:t>‹#›</a:t>
             </a:fld>
             <a:endParaRPr lang="bg-BG"/>
@@ -1472,7 +1461,7 @@
     </p:spTree>
     <p:extLst>
       <p:ext uri="{BB962C8B-B14F-4D97-AF65-F5344CB8AC3E}">
-        <p14:creationId xmlns="" xmlns:p14="http://schemas.microsoft.com/office/powerpoint/2010/main" val="2378124969"/>
+        <p14:creationId xmlns:p14="http://schemas.microsoft.com/office/powerpoint/2010/main" val="2378124969"/>
       </p:ext>
     </p:extLst>
   </p:cSld>
@@ -1709,7 +1698,6 @@
           <a:p>
             <a:fld id="{938F5CC5-E555-483F-A65E-16E573A50D64}" type="datetimeFigureOut">
               <a:rPr lang="bg-BG" smtClean="0"/>
-              <a:pPr/>
               <a:t>4.2.2015 г.</a:t>
             </a:fld>
             <a:endParaRPr lang="bg-BG"/>
@@ -1752,7 +1740,6 @@
           <a:p>
             <a:fld id="{58EF0536-55BB-4CAC-9AFA-DB428CE3602B}" type="slidenum">
               <a:rPr lang="bg-BG" smtClean="0"/>
-              <a:pPr/>
               <a:t>‹#›</a:t>
             </a:fld>
             <a:endParaRPr lang="bg-BG"/>
@@ -1762,7 +1749,7 @@
     </p:spTree>
     <p:extLst>
       <p:ext uri="{BB962C8B-B14F-4D97-AF65-F5344CB8AC3E}">
-        <p14:creationId xmlns="" xmlns:p14="http://schemas.microsoft.com/office/powerpoint/2010/main" val="3129821663"/>
+        <p14:creationId xmlns:p14="http://schemas.microsoft.com/office/powerpoint/2010/main" val="3129821663"/>
       </p:ext>
     </p:extLst>
   </p:cSld>
@@ -2133,7 +2120,6 @@
           <a:p>
             <a:fld id="{938F5CC5-E555-483F-A65E-16E573A50D64}" type="datetimeFigureOut">
               <a:rPr lang="bg-BG" smtClean="0"/>
-              <a:pPr/>
               <a:t>4.2.2015 г.</a:t>
             </a:fld>
             <a:endParaRPr lang="bg-BG"/>
@@ -2176,7 +2162,6 @@
           <a:p>
             <a:fld id="{58EF0536-55BB-4CAC-9AFA-DB428CE3602B}" type="slidenum">
               <a:rPr lang="bg-BG" smtClean="0"/>
-              <a:pPr/>
               <a:t>‹#›</a:t>
             </a:fld>
             <a:endParaRPr lang="bg-BG"/>
@@ -2186,7 +2171,7 @@
     </p:spTree>
     <p:extLst>
       <p:ext uri="{BB962C8B-B14F-4D97-AF65-F5344CB8AC3E}">
-        <p14:creationId xmlns="" xmlns:p14="http://schemas.microsoft.com/office/powerpoint/2010/main" val="2028368144"/>
+        <p14:creationId xmlns:p14="http://schemas.microsoft.com/office/powerpoint/2010/main" val="2028368144"/>
       </p:ext>
     </p:extLst>
   </p:cSld>
@@ -2253,7 +2238,6 @@
           <a:p>
             <a:fld id="{938F5CC5-E555-483F-A65E-16E573A50D64}" type="datetimeFigureOut">
               <a:rPr lang="bg-BG" smtClean="0"/>
-              <a:pPr/>
               <a:t>4.2.2015 г.</a:t>
             </a:fld>
             <a:endParaRPr lang="bg-BG"/>
@@ -2296,7 +2280,6 @@
           <a:p>
             <a:fld id="{58EF0536-55BB-4CAC-9AFA-DB428CE3602B}" type="slidenum">
               <a:rPr lang="bg-BG" smtClean="0"/>
-              <a:pPr/>
               <a:t>‹#›</a:t>
             </a:fld>
             <a:endParaRPr lang="bg-BG"/>
@@ -2306,7 +2289,7 @@
     </p:spTree>
     <p:extLst>
       <p:ext uri="{BB962C8B-B14F-4D97-AF65-F5344CB8AC3E}">
-        <p14:creationId xmlns="" xmlns:p14="http://schemas.microsoft.com/office/powerpoint/2010/main" val="425990517"/>
+        <p14:creationId xmlns:p14="http://schemas.microsoft.com/office/powerpoint/2010/main" val="425990517"/>
       </p:ext>
     </p:extLst>
   </p:cSld>
@@ -2350,7 +2333,6 @@
           <a:p>
             <a:fld id="{938F5CC5-E555-483F-A65E-16E573A50D64}" type="datetimeFigureOut">
               <a:rPr lang="bg-BG" smtClean="0"/>
-              <a:pPr/>
               <a:t>4.2.2015 г.</a:t>
             </a:fld>
             <a:endParaRPr lang="bg-BG"/>
@@ -2393,7 +2375,6 @@
           <a:p>
             <a:fld id="{58EF0536-55BB-4CAC-9AFA-DB428CE3602B}" type="slidenum">
               <a:rPr lang="bg-BG" smtClean="0"/>
-              <a:pPr/>
               <a:t>‹#›</a:t>
             </a:fld>
             <a:endParaRPr lang="bg-BG"/>
@@ -2403,7 +2384,7 @@
     </p:spTree>
     <p:extLst>
       <p:ext uri="{BB962C8B-B14F-4D97-AF65-F5344CB8AC3E}">
-        <p14:creationId xmlns="" xmlns:p14="http://schemas.microsoft.com/office/powerpoint/2010/main" val="192294484"/>
+        <p14:creationId xmlns:p14="http://schemas.microsoft.com/office/powerpoint/2010/main" val="192294484"/>
       </p:ext>
     </p:extLst>
   </p:cSld>
@@ -2629,7 +2610,6 @@
           <a:p>
             <a:fld id="{938F5CC5-E555-483F-A65E-16E573A50D64}" type="datetimeFigureOut">
               <a:rPr lang="bg-BG" smtClean="0"/>
-              <a:pPr/>
               <a:t>4.2.2015 г.</a:t>
             </a:fld>
             <a:endParaRPr lang="bg-BG"/>
@@ -2672,7 +2652,6 @@
           <a:p>
             <a:fld id="{58EF0536-55BB-4CAC-9AFA-DB428CE3602B}" type="slidenum">
               <a:rPr lang="bg-BG" smtClean="0"/>
-              <a:pPr/>
               <a:t>‹#›</a:t>
             </a:fld>
             <a:endParaRPr lang="bg-BG"/>
@@ -2682,7 +2661,7 @@
     </p:spTree>
     <p:extLst>
       <p:ext uri="{BB962C8B-B14F-4D97-AF65-F5344CB8AC3E}">
-        <p14:creationId xmlns="" xmlns:p14="http://schemas.microsoft.com/office/powerpoint/2010/main" val="2764067666"/>
+        <p14:creationId xmlns:p14="http://schemas.microsoft.com/office/powerpoint/2010/main" val="2764067666"/>
       </p:ext>
     </p:extLst>
   </p:cSld>
@@ -2884,7 +2863,6 @@
           <a:p>
             <a:fld id="{938F5CC5-E555-483F-A65E-16E573A50D64}" type="datetimeFigureOut">
               <a:rPr lang="bg-BG" smtClean="0"/>
-              <a:pPr/>
               <a:t>4.2.2015 г.</a:t>
             </a:fld>
             <a:endParaRPr lang="bg-BG"/>
@@ -2927,7 +2905,6 @@
           <a:p>
             <a:fld id="{58EF0536-55BB-4CAC-9AFA-DB428CE3602B}" type="slidenum">
               <a:rPr lang="bg-BG" smtClean="0"/>
-              <a:pPr/>
               <a:t>‹#›</a:t>
             </a:fld>
             <a:endParaRPr lang="bg-BG"/>
@@ -2937,7 +2914,7 @@
     </p:spTree>
     <p:extLst>
       <p:ext uri="{BB962C8B-B14F-4D97-AF65-F5344CB8AC3E}">
-        <p14:creationId xmlns="" xmlns:p14="http://schemas.microsoft.com/office/powerpoint/2010/main" val="1662423664"/>
+        <p14:creationId xmlns:p14="http://schemas.microsoft.com/office/powerpoint/2010/main" val="1662423664"/>
       </p:ext>
     </p:extLst>
   </p:cSld>
@@ -3099,7 +3076,6 @@
           <a:p>
             <a:fld id="{938F5CC5-E555-483F-A65E-16E573A50D64}" type="datetimeFigureOut">
               <a:rPr lang="bg-BG" smtClean="0"/>
-              <a:pPr/>
               <a:t>4.2.2015 г.</a:t>
             </a:fld>
             <a:endParaRPr lang="bg-BG"/>
@@ -3178,7 +3154,6 @@
           <a:p>
             <a:fld id="{58EF0536-55BB-4CAC-9AFA-DB428CE3602B}" type="slidenum">
               <a:rPr lang="bg-BG" smtClean="0"/>
-              <a:pPr/>
               <a:t>‹#›</a:t>
             </a:fld>
             <a:endParaRPr lang="bg-BG"/>
@@ -3188,7 +3163,7 @@
     </p:spTree>
     <p:extLst>
       <p:ext uri="{BB962C8B-B14F-4D97-AF65-F5344CB8AC3E}">
-        <p14:creationId xmlns="" xmlns:p14="http://schemas.microsoft.com/office/powerpoint/2010/main" val="3999956438"/>
+        <p14:creationId xmlns:p14="http://schemas.microsoft.com/office/powerpoint/2010/main" val="3999956438"/>
       </p:ext>
     </p:extLst>
   </p:cSld>
@@ -3495,6 +3470,211 @@
           </a:p>
         </p:txBody>
       </p:sp>
+      <p:sp>
+        <p:nvSpPr>
+          <p:cNvPr id="3" name="Content Placeholder 2"/>
+          <p:cNvSpPr>
+            <a:spLocks noGrp="1"/>
+          </p:cNvSpPr>
+          <p:nvPr>
+            <p:ph idx="1"/>
+          </p:nvPr>
+        </p:nvSpPr>
+        <p:spPr/>
+        <p:txBody>
+          <a:bodyPr/>
+          <a:lstStyle/>
+          <a:p>
+            <a:endParaRPr lang="bg-BG"/>
+          </a:p>
+        </p:txBody>
+      </p:sp>
+      <p:pic>
+        <p:nvPicPr>
+          <p:cNvPr id="1026" name="Picture 2" descr="C:\Users\Tanq\Desktop\Stonehenge_curious_aspects_1.jpg"/>
+          <p:cNvPicPr>
+            <a:picLocks noChangeAspect="1" noChangeArrowheads="1"/>
+          </p:cNvPicPr>
+          <p:nvPr/>
+        </p:nvPicPr>
+        <p:blipFill>
+          <a:blip r:embed="rId2">
+            <a:extLst>
+              <a:ext uri="{28A0092B-C50C-407E-A947-70E740481C1C}">
+                <a14:useLocalDpi xmlns:a14="http://schemas.microsoft.com/office/drawing/2010/main" val="0"/>
+              </a:ext>
+            </a:extLst>
+          </a:blip>
+          <a:srcRect/>
+          <a:stretch>
+            <a:fillRect/>
+          </a:stretch>
+        </p:blipFill>
+        <p:spPr bwMode="auto">
+          <a:xfrm>
+            <a:off x="0" y="-1"/>
+            <a:ext cx="9144000" cy="6857999"/>
+          </a:xfrm>
+          <a:prstGeom prst="rect">
+            <a:avLst/>
+          </a:prstGeom>
+          <a:noFill/>
+          <a:extLst>
+            <a:ext uri="{909E8E84-426E-40DD-AFC4-6F175D3DCCD1}">
+              <a14:hiddenFill xmlns:a14="http://schemas.microsoft.com/office/drawing/2010/main">
+                <a:solidFill>
+                  <a:srgbClr val="FFFFFF"/>
+                </a:solidFill>
+              </a14:hiddenFill>
+            </a:ext>
+          </a:extLst>
+        </p:spPr>
+      </p:pic>
+      <p:sp>
+        <p:nvSpPr>
+          <p:cNvPr id="5" name="TextBox 4"/>
+          <p:cNvSpPr txBox="1"/>
+          <p:nvPr/>
+        </p:nvSpPr>
+        <p:spPr>
+          <a:xfrm>
+            <a:off x="252578" y="430332"/>
+            <a:ext cx="8532440" cy="1446550"/>
+          </a:xfrm>
+          <a:prstGeom prst="rect">
+            <a:avLst/>
+          </a:prstGeom>
+          <a:noFill/>
+        </p:spPr>
+        <p:txBody>
+          <a:bodyPr wrap="square" rtlCol="0">
+            <a:spAutoFit/>
+          </a:bodyPr>
+          <a:lstStyle/>
+          <a:p>
+            <a:pPr algn="ctr"/>
+            <a:r>
+              <a:rPr lang="en-US" sz="8800" dirty="0">
+                <a:latin typeface="Algerian" pitchFamily="82" charset="0"/>
+              </a:rPr>
+              <a:t> </a:t>
+            </a:r>
+            <a:r>
+              <a:rPr lang="en-US" sz="8800" dirty="0">
+                <a:solidFill>
+                  <a:srgbClr val="FFFF00"/>
+                </a:solidFill>
+                <a:latin typeface="Algerian" pitchFamily="82" charset="0"/>
+              </a:rPr>
+              <a:t>SNAKE </a:t>
+            </a:r>
+            <a:r>
+              <a:rPr lang="en-US" sz="8800" dirty="0" smtClean="0">
+                <a:solidFill>
+                  <a:srgbClr val="FFFF00"/>
+                </a:solidFill>
+                <a:latin typeface="Arial Black" pitchFamily="34" charset="0"/>
+              </a:rPr>
+              <a:t> </a:t>
+            </a:r>
+            <a:endParaRPr lang="bg-BG" sz="8800" dirty="0">
+              <a:solidFill>
+                <a:srgbClr val="FFFF00"/>
+              </a:solidFill>
+              <a:latin typeface="Arial Black" pitchFamily="34" charset="0"/>
+            </a:endParaRPr>
+          </a:p>
+        </p:txBody>
+      </p:sp>
+      <p:sp>
+        <p:nvSpPr>
+          <p:cNvPr id="6" name="TextBox 5"/>
+          <p:cNvSpPr txBox="1"/>
+          <p:nvPr/>
+        </p:nvSpPr>
+        <p:spPr>
+          <a:xfrm>
+            <a:off x="305513" y="3501008"/>
+            <a:ext cx="8838487" cy="769441"/>
+          </a:xfrm>
+          <a:prstGeom prst="rect">
+            <a:avLst/>
+          </a:prstGeom>
+          <a:noFill/>
+        </p:spPr>
+        <p:txBody>
+          <a:bodyPr wrap="square" rtlCol="0">
+            <a:spAutoFit/>
+          </a:bodyPr>
+          <a:lstStyle/>
+          <a:p>
+            <a:pPr algn="ctr"/>
+            <a:r>
+              <a:rPr lang="en-US" sz="4400" dirty="0" smtClean="0">
+                <a:solidFill>
+                  <a:srgbClr val="FFFF00"/>
+                </a:solidFill>
+                <a:latin typeface="Algerian" pitchFamily="82" charset="0"/>
+              </a:rPr>
+              <a:t>Develop by StoneHenge team</a:t>
+            </a:r>
+            <a:endParaRPr lang="bg-BG" sz="4400" dirty="0">
+              <a:solidFill>
+                <a:srgbClr val="FFFF00"/>
+              </a:solidFill>
+            </a:endParaRPr>
+          </a:p>
+        </p:txBody>
+      </p:sp>
+    </p:spTree>
+    <p:extLst>
+      <p:ext uri="{BB962C8B-B14F-4D97-AF65-F5344CB8AC3E}">
+        <p14:creationId xmlns:p14="http://schemas.microsoft.com/office/powerpoint/2010/main" val="605418885"/>
+      </p:ext>
+    </p:extLst>
+  </p:cSld>
+  <p:clrMapOvr>
+    <a:masterClrMapping/>
+  </p:clrMapOvr>
+</p:sld>
+</file>
+
+<file path=ppt/slides/slide2.xml><?xml version="1.0" encoding="utf-8"?>
+<p:sld xmlns:a="http://schemas.openxmlformats.org/drawingml/2006/main" xmlns:r="http://schemas.openxmlformats.org/officeDocument/2006/relationships" xmlns:p="http://schemas.openxmlformats.org/presentationml/2006/main">
+  <p:cSld>
+    <p:spTree>
+      <p:nvGrpSpPr>
+        <p:cNvPr id="1" name=""/>
+        <p:cNvGrpSpPr/>
+        <p:nvPr/>
+      </p:nvGrpSpPr>
+      <p:grpSpPr>
+        <a:xfrm>
+          <a:off x="0" y="0"/>
+          <a:ext cx="0" cy="0"/>
+          <a:chOff x="0" y="0"/>
+          <a:chExt cx="0" cy="0"/>
+        </a:xfrm>
+      </p:grpSpPr>
+      <p:sp>
+        <p:nvSpPr>
+          <p:cNvPr id="2" name="Title 1"/>
+          <p:cNvSpPr>
+            <a:spLocks noGrp="1"/>
+          </p:cNvSpPr>
+          <p:nvPr>
+            <p:ph type="title"/>
+          </p:nvPr>
+        </p:nvSpPr>
+        <p:spPr/>
+        <p:txBody>
+          <a:bodyPr/>
+          <a:lstStyle/>
+          <a:p>
+            <a:endParaRPr lang="bg-BG"/>
+          </a:p>
+        </p:txBody>
+      </p:sp>
       <p:pic>
         <p:nvPicPr>
           <p:cNvPr id="4" name="Content Placeholder 3"/>
@@ -3506,15 +3686,21 @@
           </p:nvPr>
         </p:nvPicPr>
         <p:blipFill>
-          <a:blip r:embed="rId2" cstate="print"/>
+          <a:blip r:embed="rId2">
+            <a:extLst>
+              <a:ext uri="{28A0092B-C50C-407E-A947-70E740481C1C}">
+                <a14:useLocalDpi xmlns:a14="http://schemas.microsoft.com/office/drawing/2010/main" val="0"/>
+              </a:ext>
+            </a:extLst>
+          </a:blip>
           <a:stretch>
             <a:fillRect/>
           </a:stretch>
         </p:blipFill>
         <p:spPr>
           <a:xfrm>
-            <a:off x="-27822" y="0"/>
-            <a:ext cx="9144000" cy="6858000"/>
+            <a:off x="0" y="6979"/>
+            <a:ext cx="9199643" cy="6858000"/>
           </a:xfrm>
         </p:spPr>
       </p:pic>
@@ -3591,8 +3777,8 @@
         </p:nvSpPr>
         <p:spPr>
           <a:xfrm>
-            <a:off x="395536" y="3284984"/>
-            <a:ext cx="8280920" cy="2585323"/>
+            <a:off x="395536" y="2348880"/>
+            <a:ext cx="8280920" cy="3139321"/>
           </a:xfrm>
           <a:prstGeom prst="rect">
             <a:avLst/>
@@ -3614,7 +3800,7 @@
             </a:r>
           </a:p>
           <a:p>
-            <a:pPr algn="ctr"/>
+            <a:pPr algn="just"/>
             <a:endParaRPr lang="en-US" dirty="0">
               <a:latin typeface="Algerian" pitchFamily="82" charset="0"/>
             </a:endParaRPr>
@@ -3625,37 +3811,133 @@
               <a:rPr lang="en-US" dirty="0">
                 <a:latin typeface="Algerian" pitchFamily="82" charset="0"/>
               </a:rPr>
-              <a:t>  In our version of the game, snake grows  every time it eat an red apple. Player have to be careful to escape the borders of the canvas and never eat a black(rotten) apple.</a:t>
-            </a:r>
-          </a:p>
-          <a:p>
-            <a:pPr algn="just"/>
+              <a:t> </a:t>
+            </a:r>
+            <a:r>
+              <a:rPr lang="en-US" dirty="0" smtClean="0">
+                <a:latin typeface="Algerian" pitchFamily="82" charset="0"/>
+              </a:rPr>
+              <a:t>    In </a:t>
+            </a:r>
             <a:r>
               <a:rPr lang="en-US" dirty="0">
                 <a:latin typeface="Algerian" pitchFamily="82" charset="0"/>
               </a:rPr>
-              <a:t>The speed of the snake if fixed but the level to hardness comes of the numbers of black apples. </a:t>
-            </a:r>
-          </a:p>
-          <a:p>
-            <a:pPr algn="just"/>
+              <a:t>our version of the game, </a:t>
+            </a:r>
+            <a:r>
+              <a:rPr lang="en-US" dirty="0" smtClean="0">
+                <a:latin typeface="Algerian" pitchFamily="82" charset="0"/>
+              </a:rPr>
+              <a:t>player can rule the direction of the snake with the arrow keys</a:t>
+            </a:r>
             <a:r>
               <a:rPr lang="en-US" dirty="0">
                 <a:latin typeface="Algerian" pitchFamily="82" charset="0"/>
               </a:rPr>
-              <a:t>Player have an option to save </a:t>
+              <a:t>. every time it eat an red </a:t>
             </a:r>
             <a:r>
               <a:rPr lang="en-US" dirty="0" smtClean="0">
                 <a:latin typeface="Algerian" pitchFamily="82" charset="0"/>
               </a:rPr>
-              <a:t>his/her </a:t>
+              <a:t>apple, snake </a:t>
             </a:r>
             <a:r>
               <a:rPr lang="en-US" dirty="0">
                 <a:latin typeface="Algerian" pitchFamily="82" charset="0"/>
               </a:rPr>
-              <a:t>best score. </a:t>
+              <a:t>grows </a:t>
+            </a:r>
+            <a:r>
+              <a:rPr lang="en-US" dirty="0" smtClean="0">
+                <a:latin typeface="Algerian" pitchFamily="82" charset="0"/>
+              </a:rPr>
+              <a:t>a step and a rotten(black) apple appear on a random position.</a:t>
+            </a:r>
+          </a:p>
+          <a:p>
+            <a:pPr algn="just"/>
+            <a:r>
+              <a:rPr lang="en-US" dirty="0" smtClean="0">
+                <a:latin typeface="Algerian" pitchFamily="82" charset="0"/>
+              </a:rPr>
+              <a:t> Player need to escape </a:t>
+            </a:r>
+            <a:r>
+              <a:rPr lang="en-US" dirty="0">
+                <a:latin typeface="Algerian" pitchFamily="82" charset="0"/>
+              </a:rPr>
+              <a:t>the </a:t>
+            </a:r>
+            <a:r>
+              <a:rPr lang="en-US" dirty="0" smtClean="0">
+                <a:latin typeface="Algerian" pitchFamily="82" charset="0"/>
+              </a:rPr>
+              <a:t>rotten apples and the </a:t>
+            </a:r>
+            <a:r>
+              <a:rPr lang="en-US" dirty="0">
+                <a:latin typeface="Algerian" pitchFamily="82" charset="0"/>
+              </a:rPr>
+              <a:t>borders of the </a:t>
+            </a:r>
+            <a:r>
+              <a:rPr lang="en-US" dirty="0" smtClean="0">
+                <a:latin typeface="Algerian" pitchFamily="82" charset="0"/>
+              </a:rPr>
+              <a:t>canvas. </a:t>
+            </a:r>
+            <a:endParaRPr lang="en-US" dirty="0">
+              <a:latin typeface="Algerian" pitchFamily="82" charset="0"/>
+            </a:endParaRPr>
+          </a:p>
+          <a:p>
+            <a:pPr algn="just"/>
+            <a:r>
+              <a:rPr lang="en-US" dirty="0">
+                <a:latin typeface="Algerian" pitchFamily="82" charset="0"/>
+              </a:rPr>
+              <a:t>The speed of the snake </a:t>
+            </a:r>
+            <a:r>
+              <a:rPr lang="en-US" dirty="0" smtClean="0">
+                <a:latin typeface="Algerian" pitchFamily="82" charset="0"/>
+              </a:rPr>
+              <a:t> rising with the level </a:t>
+            </a:r>
+            <a:r>
+              <a:rPr lang="en-US" dirty="0">
+                <a:latin typeface="Algerian" pitchFamily="82" charset="0"/>
+              </a:rPr>
+              <a:t>to </a:t>
+            </a:r>
+            <a:r>
+              <a:rPr lang="en-US" dirty="0" smtClean="0">
+                <a:latin typeface="Algerian" pitchFamily="82" charset="0"/>
+              </a:rPr>
+              <a:t>hardness.</a:t>
+            </a:r>
+          </a:p>
+          <a:p>
+            <a:pPr algn="just"/>
+            <a:r>
+              <a:rPr lang="en-US" dirty="0" smtClean="0">
+                <a:latin typeface="Algerian" pitchFamily="82" charset="0"/>
+              </a:rPr>
+              <a:t> Player </a:t>
+            </a:r>
+            <a:r>
+              <a:rPr lang="en-US" dirty="0">
+                <a:latin typeface="Algerian" pitchFamily="82" charset="0"/>
+              </a:rPr>
+              <a:t>have an option to save his best score</a:t>
+            </a:r>
+            <a:r>
+              <a:rPr lang="en-US" dirty="0" smtClean="0">
+                <a:latin typeface="Algerian" pitchFamily="82" charset="0"/>
+              </a:rPr>
+              <a:t>.</a:t>
             </a:r>
             <a:endParaRPr lang="bg-BG" dirty="0"/>
           </a:p>
@@ -3667,17 +3949,24 @@
     </p:spTree>
     <p:extLst>
       <p:ext uri="{BB962C8B-B14F-4D97-AF65-F5344CB8AC3E}">
-        <p14:creationId xmlns="" xmlns:p14="http://schemas.microsoft.com/office/powerpoint/2010/main" val="2876663526"/>
+        <p14:creationId xmlns:p14="http://schemas.microsoft.com/office/powerpoint/2010/main" val="2876663526"/>
       </p:ext>
     </p:extLst>
   </p:cSld>
   <p:clrMapOvr>
     <a:masterClrMapping/>
   </p:clrMapOvr>
+  <p:timing>
+    <p:tnLst>
+      <p:par>
+        <p:cTn id="1" dur="indefinite" restart="never" nodeType="tmRoot"/>
+      </p:par>
+    </p:tnLst>
+  </p:timing>
 </p:sld>
 </file>
 
-<file path=ppt/slides/slide2.xml><?xml version="1.0" encoding="utf-8"?>
+<file path=ppt/slides/slide3.xml><?xml version="1.0" encoding="utf-8"?>
 <p:sld xmlns:a="http://schemas.openxmlformats.org/drawingml/2006/main" xmlns:r="http://schemas.openxmlformats.org/officeDocument/2006/relationships" xmlns:p="http://schemas.openxmlformats.org/presentationml/2006/main">
   <p:cSld>
     <p:bg>
@@ -3739,10 +4028,10 @@
           </p:nvPr>
         </p:nvPicPr>
         <p:blipFill>
-          <a:blip r:embed="rId2" cstate="print">
+          <a:blip r:embed="rId2">
             <a:extLst>
               <a:ext uri="{28A0092B-C50C-407E-A947-70E740481C1C}">
-                <a14:useLocalDpi xmlns="" xmlns:a14="http://schemas.microsoft.com/office/drawing/2010/main" val="0"/>
+                <a14:useLocalDpi xmlns:a14="http://schemas.microsoft.com/office/drawing/2010/main" val="0"/>
               </a:ext>
             </a:extLst>
           </a:blip>
@@ -3760,17 +4049,24 @@
     </p:spTree>
     <p:extLst>
       <p:ext uri="{BB962C8B-B14F-4D97-AF65-F5344CB8AC3E}">
-        <p14:creationId xmlns="" xmlns:p14="http://schemas.microsoft.com/office/powerpoint/2010/main" val="2463511299"/>
+        <p14:creationId xmlns:p14="http://schemas.microsoft.com/office/powerpoint/2010/main" val="2463511299"/>
       </p:ext>
     </p:extLst>
   </p:cSld>
   <p:clrMapOvr>
     <a:masterClrMapping/>
   </p:clrMapOvr>
+  <p:timing>
+    <p:tnLst>
+      <p:par>
+        <p:cTn id="1" dur="indefinite" restart="never" nodeType="tmRoot"/>
+      </p:par>
+    </p:tnLst>
+  </p:timing>
 </p:sld>
 </file>
 
-<file path=ppt/slides/slide3.xml><?xml version="1.0" encoding="utf-8"?>
+<file path=ppt/slides/slide4.xml><?xml version="1.0" encoding="utf-8"?>
 <p:sld xmlns:a="http://schemas.openxmlformats.org/drawingml/2006/main" xmlns:r="http://schemas.openxmlformats.org/officeDocument/2006/relationships" xmlns:p="http://schemas.openxmlformats.org/presentationml/2006/main">
   <p:cSld>
     <p:spTree>
@@ -3812,24 +4108,15 @@
             <a:r>
               <a:rPr lang="en-US" dirty="0" smtClean="0">
                 <a:solidFill>
-                  <a:srgbClr val="FF0000"/>
+                  <a:srgbClr val="FFFF00"/>
                 </a:solidFill>
                 <a:latin typeface="Algerian" pitchFamily="82" charset="0"/>
               </a:rPr>
-              <a:t>TEAM </a:t>
-            </a:r>
-            <a:r>
-              <a:rPr lang="en-US" dirty="0" err="1" smtClean="0">
-                <a:solidFill>
-                  <a:srgbClr val="FF0000"/>
-                </a:solidFill>
-                <a:latin typeface="Algerian" pitchFamily="82" charset="0"/>
-              </a:rPr>
-              <a:t>STONEHeNGe</a:t>
+              <a:t>TEAM STONEHeNG</a:t>
             </a:r>
             <a:endParaRPr lang="bg-BG" dirty="0">
               <a:solidFill>
-                <a:srgbClr val="FF0000"/>
+                <a:srgbClr val="FFFF00"/>
               </a:solidFill>
             </a:endParaRPr>
           </a:p>
@@ -3851,7 +4138,7 @@
             <a:ext cx="8219256" cy="4925144"/>
           </a:xfrm>
           <a:solidFill>
-            <a:schemeClr val="accent1">
+            <a:schemeClr val="accent3">
               <a:lumMod val="75000"/>
             </a:schemeClr>
           </a:solidFill>
@@ -3868,7 +4155,7 @@
             <a:r>
               <a:rPr lang="en-US" sz="4800" dirty="0" smtClean="0">
                 <a:solidFill>
-                  <a:srgbClr val="92D050"/>
+                  <a:srgbClr val="FFFF00"/>
                 </a:solidFill>
                 <a:latin typeface="Algerian" pitchFamily="82" charset="0"/>
               </a:rPr>
@@ -3880,18 +4167,12 @@
               <a:buNone/>
             </a:pPr>
             <a:endParaRPr lang="en-US" sz="4800" dirty="0" smtClean="0">
-              <a:solidFill>
-                <a:srgbClr val="92D050"/>
-              </a:solidFill>
               <a:latin typeface="Algerian" pitchFamily="82" charset="0"/>
             </a:endParaRPr>
           </a:p>
           <a:p>
             <a:r>
               <a:rPr lang="en-US" sz="2400" dirty="0" smtClean="0">
-                <a:solidFill>
-                  <a:srgbClr val="92D050"/>
-                </a:solidFill>
                 <a:latin typeface="Algerian" pitchFamily="82" charset="0"/>
               </a:rPr>
               <a:t>Aneta Marinova</a:t>
@@ -3900,9 +4181,6 @@
           <a:p>
             <a:r>
               <a:rPr lang="en-US" sz="2400" dirty="0" smtClean="0">
-                <a:solidFill>
-                  <a:srgbClr val="92D050"/>
-                </a:solidFill>
                 <a:latin typeface="Algerian" pitchFamily="82" charset="0"/>
               </a:rPr>
               <a:t>Angel Djambazov</a:t>
@@ -3911,9 +4189,6 @@
           <a:p>
             <a:r>
               <a:rPr lang="en-US" sz="2400" dirty="0" smtClean="0">
-                <a:solidFill>
-                  <a:srgbClr val="92D050"/>
-                </a:solidFill>
                 <a:latin typeface="Algerian" pitchFamily="82" charset="0"/>
               </a:rPr>
               <a:t>Ivan Krastev</a:t>
@@ -3922,9 +4197,6 @@
           <a:p>
             <a:r>
               <a:rPr lang="en-US" sz="2400" dirty="0" smtClean="0">
-                <a:solidFill>
-                  <a:srgbClr val="92D050"/>
-                </a:solidFill>
                 <a:latin typeface="Algerian" pitchFamily="82" charset="0"/>
               </a:rPr>
               <a:t>Adelina Yanakieva</a:t>
@@ -3933,9 +4205,6 @@
           <a:p>
             <a:r>
               <a:rPr lang="en-US" sz="2400" dirty="0" smtClean="0">
-                <a:solidFill>
-                  <a:srgbClr val="92D050"/>
-                </a:solidFill>
                 <a:latin typeface="Algerian" pitchFamily="82" charset="0"/>
               </a:rPr>
               <a:t>Petar Kanev</a:t>
@@ -3944,9 +4213,6 @@
           <a:p>
             <a:r>
               <a:rPr lang="en-US" sz="2400" dirty="0" smtClean="0">
-                <a:solidFill>
-                  <a:srgbClr val="92D050"/>
-                </a:solidFill>
                 <a:latin typeface="Algerian" pitchFamily="82" charset="0"/>
               </a:rPr>
               <a:t>Tanya Delcheva </a:t>
@@ -3957,9 +4223,6 @@
               <a:buNone/>
             </a:pPr>
             <a:endParaRPr lang="en-US" sz="2400" dirty="0" smtClean="0">
-              <a:solidFill>
-                <a:srgbClr val="92D050"/>
-              </a:solidFill>
               <a:latin typeface="Algerian" pitchFamily="82" charset="0"/>
             </a:endParaRPr>
           </a:p>
@@ -3969,9 +4232,6 @@
             </a:pPr>
             <a:r>
               <a:rPr lang="en-US" sz="2600" dirty="0" smtClean="0">
-                <a:solidFill>
-                  <a:srgbClr val="92D050"/>
-                </a:solidFill>
                 <a:latin typeface="Andalus" pitchFamily="18" charset="-78"/>
                 <a:cs typeface="Andalus" pitchFamily="18" charset="-78"/>
               </a:rPr>
@@ -3984,9 +4244,6 @@
             </a:pPr>
             <a:r>
               <a:rPr lang="en-US" sz="2600" dirty="0" smtClean="0">
-                <a:solidFill>
-                  <a:srgbClr val="92D050"/>
-                </a:solidFill>
                 <a:latin typeface="Andalus" pitchFamily="18" charset="-78"/>
                 <a:cs typeface="Andalus" pitchFamily="18" charset="-78"/>
               </a:rPr>
@@ -3994,9 +4251,6 @@
             </a:r>
             <a:r>
               <a:rPr lang="en-US" dirty="0" smtClean="0">
-                <a:solidFill>
-                  <a:srgbClr val="92D050"/>
-                </a:solidFill>
                 <a:latin typeface="Andalus" pitchFamily="18" charset="-78"/>
                 <a:cs typeface="Andalus" pitchFamily="18" charset="-78"/>
               </a:rPr>
@@ -4010,7 +4264,7 @@
             <a:r>
               <a:rPr lang="en-US" b="1" dirty="0" smtClean="0">
                 <a:solidFill>
-                  <a:srgbClr val="92D050"/>
+                  <a:srgbClr val="FFFF00"/>
                 </a:solidFill>
                 <a:latin typeface="Andalus" pitchFamily="18" charset="-78"/>
                 <a:cs typeface="Andalus" pitchFamily="18" charset="-78"/>
@@ -4043,13 +4297,20 @@
     </p:spTree>
     <p:extLst>
       <p:ext uri="{BB962C8B-B14F-4D97-AF65-F5344CB8AC3E}">
-        <p14:creationId xmlns="" xmlns:p14="http://schemas.microsoft.com/office/powerpoint/2010/main" val="2177953758"/>
+        <p14:creationId xmlns:p14="http://schemas.microsoft.com/office/powerpoint/2010/main" val="2177953758"/>
       </p:ext>
     </p:extLst>
   </p:cSld>
   <p:clrMapOvr>
     <a:masterClrMapping/>
   </p:clrMapOvr>
+  <p:timing>
+    <p:tnLst>
+      <p:par>
+        <p:cTn id="1" dur="indefinite" restart="never" nodeType="tmRoot"/>
+      </p:par>
+    </p:tnLst>
+  </p:timing>
 </p:sld>
 </file>
 

</xml_diff>